<commit_message>
update ppt tx rx pin
</commit_message>
<xml_diff>
--- a/PPT/esp32+RPi.pptx
+++ b/PPT/esp32+RPi.pptx
@@ -223,7 +223,7 @@
           <a:p>
             <a:fld id="{6A9282C2-CE41-4C5F-A7B2-CC16AA6DAB65}" type="datetimeFigureOut">
               <a:rPr lang="zh-TW" altLang="en-US" smtClean="0"/>
-              <a:t>2023/1/13</a:t>
+              <a:t>2023/3/22</a:t>
             </a:fld>
             <a:endParaRPr lang="zh-TW" altLang="en-US"/>
           </a:p>
@@ -725,7 +725,7 @@
           <a:p>
             <a:fld id="{EB83E18A-9F91-49E8-96C6-A686C299A920}" type="datetime1">
               <a:rPr lang="zh-TW" altLang="en-US" smtClean="0"/>
-              <a:t>2023/1/13</a:t>
+              <a:t>2023/3/22</a:t>
             </a:fld>
             <a:endParaRPr lang="zh-TW" altLang="en-US"/>
           </a:p>
@@ -939,7 +939,7 @@
           <a:p>
             <a:fld id="{33225CD1-C1C2-490C-93A0-8443B9E7B413}" type="datetime1">
               <a:rPr lang="zh-TW" altLang="en-US" smtClean="0"/>
-              <a:t>2023/1/13</a:t>
+              <a:t>2023/3/22</a:t>
             </a:fld>
             <a:endParaRPr lang="zh-TW" altLang="en-US"/>
           </a:p>
@@ -1147,7 +1147,7 @@
           <a:p>
             <a:fld id="{8A975B64-39A9-4DC8-BC04-66F2AADB301E}" type="datetime1">
               <a:rPr lang="zh-TW" altLang="en-US" smtClean="0"/>
-              <a:t>2023/1/13</a:t>
+              <a:t>2023/3/22</a:t>
             </a:fld>
             <a:endParaRPr lang="zh-TW" altLang="en-US"/>
           </a:p>
@@ -1345,7 +1345,7 @@
           <a:p>
             <a:fld id="{8C11707C-E79C-40B3-9537-15204DEB168B}" type="datetime1">
               <a:rPr lang="zh-TW" altLang="en-US" smtClean="0"/>
-              <a:t>2023/1/13</a:t>
+              <a:t>2023/3/22</a:t>
             </a:fld>
             <a:endParaRPr lang="zh-TW" altLang="en-US"/>
           </a:p>
@@ -1797,7 +1797,7 @@
           <a:p>
             <a:fld id="{F571A2DF-C63D-4588-AA88-80F07F9E4758}" type="datetime1">
               <a:rPr lang="zh-TW" altLang="en-US" smtClean="0"/>
-              <a:t>2023/1/13</a:t>
+              <a:t>2023/3/22</a:t>
             </a:fld>
             <a:endParaRPr lang="zh-TW" altLang="en-US"/>
           </a:p>
@@ -2239,7 +2239,7 @@
           <a:p>
             <a:fld id="{9DC67A3F-018D-4F55-9920-23D9D947B205}" type="datetime1">
               <a:rPr lang="zh-TW" altLang="en-US" smtClean="0"/>
-              <a:t>2023/1/13</a:t>
+              <a:t>2023/3/22</a:t>
             </a:fld>
             <a:endParaRPr lang="zh-TW" altLang="en-US"/>
           </a:p>
@@ -2828,7 +2828,7 @@
           <a:p>
             <a:fld id="{319E2308-336F-4A01-AB67-55223D0A2BEC}" type="datetime1">
               <a:rPr lang="zh-TW" altLang="en-US" smtClean="0"/>
-              <a:t>2023/1/13</a:t>
+              <a:t>2023/3/22</a:t>
             </a:fld>
             <a:endParaRPr lang="zh-TW" altLang="en-US"/>
           </a:p>
@@ -3146,7 +3146,7 @@
           <a:p>
             <a:fld id="{4673CDF8-CBCA-441D-8641-F279F6741E85}" type="datetime1">
               <a:rPr lang="zh-TW" altLang="en-US" smtClean="0"/>
-              <a:t>2023/1/13</a:t>
+              <a:t>2023/3/22</a:t>
             </a:fld>
             <a:endParaRPr lang="zh-TW" altLang="en-US"/>
           </a:p>
@@ -3259,7 +3259,7 @@
           <a:p>
             <a:fld id="{57E6BB04-3056-4C14-89C4-6D5CDB51B5D7}" type="datetime1">
               <a:rPr lang="zh-TW" altLang="en-US" smtClean="0"/>
-              <a:t>2023/1/13</a:t>
+              <a:t>2023/3/22</a:t>
             </a:fld>
             <a:endParaRPr lang="zh-TW" altLang="en-US"/>
           </a:p>
@@ -3570,7 +3570,7 @@
           <a:p>
             <a:fld id="{1DBB2D41-CE38-491E-A5F5-F23E09ED8FBE}" type="datetime1">
               <a:rPr lang="zh-TW" altLang="en-US" smtClean="0"/>
-              <a:t>2023/1/13</a:t>
+              <a:t>2023/3/22</a:t>
             </a:fld>
             <a:endParaRPr lang="zh-TW" altLang="en-US"/>
           </a:p>
@@ -3858,7 +3858,7 @@
           <a:p>
             <a:fld id="{20A83B6A-DBE9-43DF-8294-CB5A97C0C28A}" type="datetime1">
               <a:rPr lang="zh-TW" altLang="en-US" smtClean="0"/>
-              <a:t>2023/1/13</a:t>
+              <a:t>2023/3/22</a:t>
             </a:fld>
             <a:endParaRPr lang="zh-TW" altLang="en-US"/>
           </a:p>
@@ -4104,7 +4104,7 @@
           <a:p>
             <a:fld id="{29F7A7A4-BBC4-418F-94CF-E01E79D44814}" type="datetime1">
               <a:rPr lang="zh-TW" altLang="en-US" smtClean="0"/>
-              <a:t>2023/1/13</a:t>
+              <a:t>2023/3/22</a:t>
             </a:fld>
             <a:endParaRPr lang="zh-TW" altLang="en-US"/>
           </a:p>
@@ -13856,7 +13856,7 @@
                 <a:ea typeface="標楷體" panose="03000509000000000000" pitchFamily="65" charset="-120"/>
                 <a:cs typeface="Times New Roman" panose="02020603050405020304" pitchFamily="18" charset="0"/>
               </a:rPr>
-              <a:t>of esp32(16)</a:t>
+              <a:t>of esp32(17)</a:t>
             </a:r>
             <a:endParaRPr lang="zh-TW" altLang="en-US" sz="1600" dirty="0">
               <a:latin typeface="Times New Roman" panose="02020603050405020304" pitchFamily="18" charset="0"/>
@@ -13916,7 +13916,7 @@
                 <a:ea typeface="標楷體" panose="03000509000000000000" pitchFamily="65" charset="-120"/>
                 <a:cs typeface="Times New Roman" panose="02020603050405020304" pitchFamily="18" charset="0"/>
               </a:rPr>
-              <a:t>of esp32(17)</a:t>
+              <a:t>of esp32(16)</a:t>
             </a:r>
             <a:endParaRPr lang="zh-TW" altLang="en-US" sz="1600" dirty="0">
               <a:latin typeface="Times New Roman" panose="02020603050405020304" pitchFamily="18" charset="0"/>

</xml_diff>